<commit_message>
Added code style presentation and updated lesson  #4
</commit_message>
<xml_diff>
--- a/Presentation/lesson-04.pptx
+++ b/Presentation/lesson-04.pptx
@@ -14,14 +14,15 @@
     <p:sldId id="261" r:id="rId8"/>
     <p:sldId id="262" r:id="rId9"/>
     <p:sldId id="263" r:id="rId10"/>
-    <p:sldId id="264" r:id="rId11"/>
-    <p:sldId id="265" r:id="rId12"/>
-    <p:sldId id="266" r:id="rId13"/>
-    <p:sldId id="267" r:id="rId14"/>
-    <p:sldId id="268" r:id="rId15"/>
-    <p:sldId id="269" r:id="rId16"/>
-    <p:sldId id="270" r:id="rId17"/>
-    <p:sldId id="271" r:id="rId18"/>
+    <p:sldId id="275" r:id="rId11"/>
+    <p:sldId id="264" r:id="rId12"/>
+    <p:sldId id="265" r:id="rId13"/>
+    <p:sldId id="266" r:id="rId14"/>
+    <p:sldId id="267" r:id="rId15"/>
+    <p:sldId id="268" r:id="rId16"/>
+    <p:sldId id="269" r:id="rId17"/>
+    <p:sldId id="270" r:id="rId18"/>
+    <p:sldId id="271" r:id="rId19"/>
   </p:sldIdLst>
   <p:sldSz cx="9144000" cy="6858000" type="screen4x3"/>
   <p:notesSz cx="6858000" cy="9144000"/>
@@ -304,7 +305,7 @@
           <a:p>
             <a:fld id="{FAECF776-F836-4CCD-9497-99E5597B8B5D}" type="datetimeFigureOut">
               <a:rPr lang="en-US" smtClean="0"/>
-              <a:t>8/17/2012</a:t>
+              <a:t>8/21/2012</a:t>
             </a:fld>
             <a:endParaRPr lang="en-US"/>
           </a:p>
@@ -474,7 +475,7 @@
           <a:p>
             <a:fld id="{FAECF776-F836-4CCD-9497-99E5597B8B5D}" type="datetimeFigureOut">
               <a:rPr lang="en-US" smtClean="0"/>
-              <a:t>8/17/2012</a:t>
+              <a:t>8/21/2012</a:t>
             </a:fld>
             <a:endParaRPr lang="en-US"/>
           </a:p>
@@ -654,7 +655,7 @@
           <a:p>
             <a:fld id="{FAECF776-F836-4CCD-9497-99E5597B8B5D}" type="datetimeFigureOut">
               <a:rPr lang="en-US" smtClean="0"/>
-              <a:t>8/17/2012</a:t>
+              <a:t>8/21/2012</a:t>
             </a:fld>
             <a:endParaRPr lang="en-US"/>
           </a:p>
@@ -824,7 +825,7 @@
           <a:p>
             <a:fld id="{FAECF776-F836-4CCD-9497-99E5597B8B5D}" type="datetimeFigureOut">
               <a:rPr lang="en-US" smtClean="0"/>
-              <a:t>8/17/2012</a:t>
+              <a:t>8/21/2012</a:t>
             </a:fld>
             <a:endParaRPr lang="en-US"/>
           </a:p>
@@ -1070,7 +1071,7 @@
           <a:p>
             <a:fld id="{FAECF776-F836-4CCD-9497-99E5597B8B5D}" type="datetimeFigureOut">
               <a:rPr lang="en-US" smtClean="0"/>
-              <a:t>8/17/2012</a:t>
+              <a:t>8/21/2012</a:t>
             </a:fld>
             <a:endParaRPr lang="en-US"/>
           </a:p>
@@ -1358,7 +1359,7 @@
           <a:p>
             <a:fld id="{FAECF776-F836-4CCD-9497-99E5597B8B5D}" type="datetimeFigureOut">
               <a:rPr lang="en-US" smtClean="0"/>
-              <a:t>8/17/2012</a:t>
+              <a:t>8/21/2012</a:t>
             </a:fld>
             <a:endParaRPr lang="en-US"/>
           </a:p>
@@ -1780,7 +1781,7 @@
           <a:p>
             <a:fld id="{FAECF776-F836-4CCD-9497-99E5597B8B5D}" type="datetimeFigureOut">
               <a:rPr lang="en-US" smtClean="0"/>
-              <a:t>8/17/2012</a:t>
+              <a:t>8/21/2012</a:t>
             </a:fld>
             <a:endParaRPr lang="en-US"/>
           </a:p>
@@ -1898,7 +1899,7 @@
           <a:p>
             <a:fld id="{FAECF776-F836-4CCD-9497-99E5597B8B5D}" type="datetimeFigureOut">
               <a:rPr lang="en-US" smtClean="0"/>
-              <a:t>8/17/2012</a:t>
+              <a:t>8/21/2012</a:t>
             </a:fld>
             <a:endParaRPr lang="en-US"/>
           </a:p>
@@ -1993,7 +1994,7 @@
           <a:p>
             <a:fld id="{FAECF776-F836-4CCD-9497-99E5597B8B5D}" type="datetimeFigureOut">
               <a:rPr lang="en-US" smtClean="0"/>
-              <a:t>8/17/2012</a:t>
+              <a:t>8/21/2012</a:t>
             </a:fld>
             <a:endParaRPr lang="en-US"/>
           </a:p>
@@ -2270,7 +2271,7 @@
           <a:p>
             <a:fld id="{FAECF776-F836-4CCD-9497-99E5597B8B5D}" type="datetimeFigureOut">
               <a:rPr lang="en-US" smtClean="0"/>
-              <a:t>8/17/2012</a:t>
+              <a:t>8/21/2012</a:t>
             </a:fld>
             <a:endParaRPr lang="en-US"/>
           </a:p>
@@ -2523,7 +2524,7 @@
           <a:p>
             <a:fld id="{FAECF776-F836-4CCD-9497-99E5597B8B5D}" type="datetimeFigureOut">
               <a:rPr lang="en-US" smtClean="0"/>
-              <a:t>8/17/2012</a:t>
+              <a:t>8/21/2012</a:t>
             </a:fld>
             <a:endParaRPr lang="en-US"/>
           </a:p>
@@ -2736,7 +2737,7 @@
           <a:p>
             <a:fld id="{FAECF776-F836-4CCD-9497-99E5597B8B5D}" type="datetimeFigureOut">
               <a:rPr lang="en-US" smtClean="0"/>
-              <a:t>8/17/2012</a:t>
+              <a:t>8/21/2012</a:t>
             </a:fld>
             <a:endParaRPr lang="en-US"/>
           </a:p>
@@ -3310,6 +3311,188 @@
 </file>
 
 <file path=ppt/slides/slide10.xml><?xml version="1.0" encoding="utf-8"?>
+<p:sld xmlns:a="http://schemas.openxmlformats.org/drawingml/2006/main" xmlns:r="http://schemas.openxmlformats.org/officeDocument/2006/relationships" xmlns:p="http://schemas.openxmlformats.org/presentationml/2006/main">
+  <p:cSld>
+    <p:bg>
+      <p:bgPr>
+        <a:blipFill dpi="0" rotWithShape="1">
+          <a:blip r:embed="rId2">
+            <a:lum/>
+          </a:blip>
+          <a:srcRect/>
+          <a:stretch>
+            <a:fillRect/>
+          </a:stretch>
+        </a:blipFill>
+        <a:effectLst/>
+      </p:bgPr>
+    </p:bg>
+    <p:spTree>
+      <p:nvGrpSpPr>
+        <p:cNvPr id="1" name=""/>
+        <p:cNvGrpSpPr/>
+        <p:nvPr/>
+      </p:nvGrpSpPr>
+      <p:grpSpPr>
+        <a:xfrm>
+          <a:off x="0" y="0"/>
+          <a:ext cx="0" cy="0"/>
+          <a:chOff x="0" y="0"/>
+          <a:chExt cx="0" cy="0"/>
+        </a:xfrm>
+      </p:grpSpPr>
+      <p:sp>
+        <p:nvSpPr>
+          <p:cNvPr id="7170" name="Прямоугольник 6"/>
+          <p:cNvSpPr>
+            <a:spLocks noChangeArrowheads="1"/>
+          </p:cNvSpPr>
+          <p:nvPr/>
+        </p:nvSpPr>
+        <p:spPr bwMode="auto">
+          <a:xfrm>
+            <a:off x="2595563" y="0"/>
+            <a:ext cx="3368936" cy="461665"/>
+          </a:xfrm>
+          <a:prstGeom prst="rect">
+            <a:avLst/>
+          </a:prstGeom>
+          <a:noFill/>
+          <a:ln>
+            <a:noFill/>
+          </a:ln>
+          <a:extLst>
+            <a:ext uri="{909E8E84-426E-40DD-AFC4-6F175D3DCCD1}">
+              <a14:hiddenFill xmlns:a14="http://schemas.microsoft.com/office/drawing/2010/main">
+                <a:solidFill>
+                  <a:srgbClr val="FFFFFF"/>
+                </a:solidFill>
+              </a14:hiddenFill>
+            </a:ext>
+            <a:ext uri="{91240B29-F687-4F45-9708-019B960494DF}">
+              <a14:hiddenLine xmlns:a14="http://schemas.microsoft.com/office/drawing/2010/main" w="9525">
+                <a:solidFill>
+                  <a:srgbClr val="000000"/>
+                </a:solidFill>
+                <a:miter lim="800000"/>
+                <a:headEnd/>
+                <a:tailEnd/>
+              </a14:hiddenLine>
+            </a:ext>
+          </a:extLst>
+        </p:spPr>
+        <p:txBody>
+          <a:bodyPr wrap="none">
+            <a:spAutoFit/>
+          </a:bodyPr>
+          <a:lstStyle/>
+          <a:p>
+            <a:r>
+              <a:rPr lang="ru-RU" sz="2400" b="1" smtClean="0"/>
+              <a:t>Правила хорошего тона</a:t>
+            </a:r>
+            <a:endParaRPr lang="ru-RU" sz="2400" b="1" dirty="0"/>
+          </a:p>
+        </p:txBody>
+      </p:sp>
+      <p:sp>
+        <p:nvSpPr>
+          <p:cNvPr id="2" name="TextBox 1"/>
+          <p:cNvSpPr txBox="1"/>
+          <p:nvPr/>
+        </p:nvSpPr>
+        <p:spPr>
+          <a:xfrm>
+            <a:off x="323528" y="1124744"/>
+            <a:ext cx="8496944" cy="2308324"/>
+          </a:xfrm>
+          <a:prstGeom prst="rect">
+            <a:avLst/>
+          </a:prstGeom>
+          <a:noFill/>
+        </p:spPr>
+        <p:txBody>
+          <a:bodyPr wrap="square" rtlCol="0">
+            <a:spAutoFit/>
+          </a:bodyPr>
+          <a:lstStyle/>
+          <a:p>
+            <a:r>
+              <a:rPr lang="en-US" dirty="0" smtClean="0"/>
+              <a:t>Windows – </a:t>
+            </a:r>
+            <a:r>
+              <a:rPr lang="ru-RU" dirty="0" smtClean="0"/>
+              <a:t>многозадачная, многопользовательская, сетевая ОС и программы должны это учитывать.</a:t>
+            </a:r>
+          </a:p>
+          <a:p>
+            <a:endParaRPr lang="ru-RU" dirty="0"/>
+          </a:p>
+          <a:p>
+            <a:r>
+              <a:rPr lang="ru-RU" dirty="0" smtClean="0"/>
+              <a:t>Реестр </a:t>
+            </a:r>
+            <a:r>
+              <a:rPr lang="en-US" dirty="0" smtClean="0"/>
+              <a:t>(registry) – HKLM, HKCU</a:t>
+            </a:r>
+          </a:p>
+          <a:p>
+            <a:endParaRPr lang="en-US" dirty="0"/>
+          </a:p>
+          <a:p>
+            <a:r>
+              <a:rPr lang="ru-RU" dirty="0" smtClean="0"/>
+              <a:t>Профили пользователя. Роуминг </a:t>
+            </a:r>
+            <a:r>
+              <a:rPr lang="en-US" dirty="0" smtClean="0"/>
+              <a:t>(roaming) </a:t>
+            </a:r>
+            <a:r>
+              <a:rPr lang="ru-RU" dirty="0" smtClean="0"/>
+              <a:t>профиля</a:t>
+            </a:r>
+          </a:p>
+          <a:p>
+            <a:endParaRPr lang="ru-RU" dirty="0"/>
+          </a:p>
+          <a:p>
+            <a:r>
+              <a:rPr lang="en-US" dirty="0" smtClean="0"/>
+              <a:t>%Program Files% </a:t>
+            </a:r>
+            <a:r>
+              <a:rPr lang="ru-RU" dirty="0" smtClean="0"/>
+              <a:t>- только для чтения!</a:t>
+            </a:r>
+            <a:endParaRPr lang="en-US" dirty="0"/>
+          </a:p>
+        </p:txBody>
+      </p:sp>
+    </p:spTree>
+    <p:extLst>
+      <p:ext uri="{BB962C8B-B14F-4D97-AF65-F5344CB8AC3E}">
+        <p14:creationId xmlns:p14="http://schemas.microsoft.com/office/powerpoint/2010/main" val="243490356"/>
+      </p:ext>
+    </p:extLst>
+  </p:cSld>
+  <p:clrMapOvr>
+    <a:masterClrMapping/>
+  </p:clrMapOvr>
+  <p:timing>
+    <p:tnLst>
+      <p:par>
+        <p:cTn id="1" dur="indefinite" restart="never" nodeType="tmRoot"/>
+      </p:par>
+    </p:tnLst>
+  </p:timing>
+</p:sld>
+</file>
+
+<file path=ppt/slides/slide11.xml><?xml version="1.0" encoding="utf-8"?>
 <p:sld xmlns:a="http://schemas.openxmlformats.org/drawingml/2006/main" xmlns:r="http://schemas.openxmlformats.org/officeDocument/2006/relationships" xmlns:p="http://schemas.openxmlformats.org/presentationml/2006/main">
   <p:cSld>
     <p:bg>
@@ -5076,7 +5259,7 @@
 </p:sld>
 </file>
 
-<file path=ppt/slides/slide11.xml><?xml version="1.0" encoding="utf-8"?>
+<file path=ppt/slides/slide12.xml><?xml version="1.0" encoding="utf-8"?>
 <p:sld xmlns:a="http://schemas.openxmlformats.org/drawingml/2006/main" xmlns:r="http://schemas.openxmlformats.org/officeDocument/2006/relationships" xmlns:p="http://schemas.openxmlformats.org/presentationml/2006/main">
   <p:cSld>
     <p:bg>
@@ -6516,7 +6699,7 @@
 </p:sld>
 </file>
 
-<file path=ppt/slides/slide12.xml><?xml version="1.0" encoding="utf-8"?>
+<file path=ppt/slides/slide13.xml><?xml version="1.0" encoding="utf-8"?>
 <p:sld xmlns:a="http://schemas.openxmlformats.org/drawingml/2006/main" xmlns:r="http://schemas.openxmlformats.org/officeDocument/2006/relationships" xmlns:p="http://schemas.openxmlformats.org/presentationml/2006/main">
   <p:cSld>
     <p:bg>
@@ -7462,7 +7645,7 @@
 </p:sld>
 </file>
 
-<file path=ppt/slides/slide13.xml><?xml version="1.0" encoding="utf-8"?>
+<file path=ppt/slides/slide14.xml><?xml version="1.0" encoding="utf-8"?>
 <p:sld xmlns:a="http://schemas.openxmlformats.org/drawingml/2006/main" xmlns:r="http://schemas.openxmlformats.org/officeDocument/2006/relationships" xmlns:p="http://schemas.openxmlformats.org/presentationml/2006/main">
   <p:cSld>
     <p:bg>
@@ -8430,7 +8613,7 @@
 </p:sld>
 </file>
 
-<file path=ppt/slides/slide14.xml><?xml version="1.0" encoding="utf-8"?>
+<file path=ppt/slides/slide15.xml><?xml version="1.0" encoding="utf-8"?>
 <p:sld xmlns:a="http://schemas.openxmlformats.org/drawingml/2006/main" xmlns:r="http://schemas.openxmlformats.org/officeDocument/2006/relationships" xmlns:p="http://schemas.openxmlformats.org/presentationml/2006/main">
   <p:cSld>
     <p:bg>
@@ -9607,7 +9790,7 @@
 </p:sld>
 </file>
 
-<file path=ppt/slides/slide15.xml><?xml version="1.0" encoding="utf-8"?>
+<file path=ppt/slides/slide16.xml><?xml version="1.0" encoding="utf-8"?>
 <p:sld xmlns:a="http://schemas.openxmlformats.org/drawingml/2006/main" xmlns:r="http://schemas.openxmlformats.org/officeDocument/2006/relationships" xmlns:p="http://schemas.openxmlformats.org/presentationml/2006/main">
   <p:cSld>
     <p:bg>
@@ -10728,7 +10911,7 @@
 </p:sld>
 </file>
 
-<file path=ppt/slides/slide16.xml><?xml version="1.0" encoding="utf-8"?>
+<file path=ppt/slides/slide17.xml><?xml version="1.0" encoding="utf-8"?>
 <p:sld xmlns:a="http://schemas.openxmlformats.org/drawingml/2006/main" xmlns:r="http://schemas.openxmlformats.org/officeDocument/2006/relationships" xmlns:p="http://schemas.openxmlformats.org/presentationml/2006/main">
   <p:cSld>
     <p:bg>
@@ -11824,7 +12007,7 @@
 </p:sld>
 </file>
 
-<file path=ppt/slides/slide17.xml><?xml version="1.0" encoding="utf-8"?>
+<file path=ppt/slides/slide18.xml><?xml version="1.0" encoding="utf-8"?>
 <p:sld xmlns:a="http://schemas.openxmlformats.org/drawingml/2006/main" xmlns:r="http://schemas.openxmlformats.org/officeDocument/2006/relationships" xmlns:p="http://schemas.openxmlformats.org/presentationml/2006/main">
   <p:cSld>
     <p:bg>

</xml_diff>